<commit_message>
(e)Root, View, Controller, tmpl_kiwi, and other template files
</commit_message>
<xml_diff>
--- a/doc/layout(specification_in_slideNote).pptx
+++ b/doc/layout(specification_in_slideNote).pptx
@@ -206,7 +206,7 @@
           <a:p>
             <a:fld id="{4896269B-4557-4528-9720-78BD4DC11D7E}" type="datetimeFigureOut">
               <a:rPr lang="en-US" smtClean="0"/>
-              <a:t>8/6/15 Thu</a:t>
+              <a:t>8/9/15 Sun</a:t>
             </a:fld>
             <a:endParaRPr lang="en-US"/>
           </a:p>
@@ -555,13 +555,18 @@
           <a:p>
             <a:r>
               <a:rPr lang="en-US" dirty="0" smtClean="0"/>
-              <a:t>header</a:t>
-            </a:r>
+              <a:t>#header</a:t>
+            </a:r>
+            <a:endParaRPr lang="en-US" dirty="0" smtClean="0"/>
           </a:p>
           <a:p>
             <a:r>
               <a:rPr lang="en-US" dirty="0" smtClean="0"/>
-              <a:t>  logo,</a:t>
+              <a:t>	logo</a:t>
+            </a:r>
+            <a:r>
+              <a:rPr lang="en-US" dirty="0" smtClean="0"/>
+              <a:t>,</a:t>
             </a:r>
             <a:r>
               <a:rPr lang="en-US" baseline="0" dirty="0" smtClean="0"/>
@@ -597,26 +602,21 @@
           </a:p>
           <a:p>
             <a:r>
-              <a:rPr lang="en-US" dirty="0" err="1" smtClean="0"/>
-              <a:t>upper_bar</a:t>
-            </a:r>
-            <a:endParaRPr lang="en-US" dirty="0" smtClean="0"/>
-          </a:p>
-          <a:p>
-            <a:r>
               <a:rPr lang="en-US" baseline="0" dirty="0" smtClean="0"/>
-              <a:t>  board, </a:t>
-            </a:r>
-            <a:r>
-              <a:rPr lang="en-US" baseline="0" dirty="0" err="1" smtClean="0"/>
-              <a:t>ad_top</a:t>
-            </a:r>
-            <a:endParaRPr lang="en-US" baseline="0" dirty="0" smtClean="0"/>
-          </a:p>
-          <a:p>
-            <a:endParaRPr lang="en-US" baseline="0" dirty="0" smtClean="0"/>
-          </a:p>
-          <a:p>
+              <a:t>#container</a:t>
+            </a:r>
+          </a:p>
+          <a:p>
+            <a:r>
+              <a:rPr lang="en-US" baseline="0" dirty="0" smtClean="0"/>
+              <a:t>	#content</a:t>
+            </a:r>
+          </a:p>
+          <a:p>
+            <a:r>
+              <a:rPr lang="en-US" baseline="0" dirty="0" smtClean="0"/>
+              <a:t>		.</a:t>
+            </a:r>
             <a:r>
               <a:rPr lang="en-US" baseline="0" dirty="0" err="1" smtClean="0"/>
               <a:t>entry_pane</a:t>
@@ -624,27 +624,62 @@
             <a:endParaRPr lang="en-US" baseline="0" dirty="0" smtClean="0"/>
           </a:p>
           <a:p>
+            <a:pPr marL="0" marR="0" indent="0" algn="l" defTabSz="914400" rtl="0" eaLnBrk="1" fontAlgn="auto" latinLnBrk="0" hangingPunct="1">
+              <a:lnSpc>
+                <a:spcPct val="100000"/>
+              </a:lnSpc>
+              <a:spcBef>
+                <a:spcPts val="0"/>
+              </a:spcBef>
+              <a:spcAft>
+                <a:spcPts val="0"/>
+              </a:spcAft>
+              <a:buClrTx/>
+              <a:buSzTx/>
+              <a:buFontTx/>
+              <a:buNone/>
+              <a:tabLst/>
+              <a:defRPr/>
+            </a:pPr>
             <a:r>
               <a:rPr lang="en-US" baseline="0" dirty="0" smtClean="0"/>
-              <a:t>  entry(Term</a:t>
-            </a:r>
-            <a:r>
-              <a:rPr lang="ko-KR" altLang="en-US" baseline="0" dirty="0" smtClean="0"/>
-              <a:t>페이지에 상세서술</a:t>
-            </a:r>
+              <a:t>	.spot</a:t>
+            </a:r>
+          </a:p>
+          <a:p>
+            <a:pPr marL="0" marR="0" indent="0" algn="l" defTabSz="914400" rtl="0" eaLnBrk="1" fontAlgn="auto" latinLnBrk="0" hangingPunct="1">
+              <a:lnSpc>
+                <a:spcPct val="100000"/>
+              </a:lnSpc>
+              <a:spcBef>
+                <a:spcPts val="0"/>
+              </a:spcBef>
+              <a:spcAft>
+                <a:spcPts val="0"/>
+              </a:spcAft>
+              <a:buClrTx/>
+              <a:buSzTx/>
+              <a:buFontTx/>
+              <a:buNone/>
+              <a:tabLst/>
+              <a:defRPr/>
+            </a:pPr>
             <a:r>
               <a:rPr lang="en-US" baseline="0" dirty="0" smtClean="0"/>
-              <a:t>)</a:t>
-            </a:r>
-          </a:p>
-          <a:p>
+              <a:t>		</a:t>
+            </a:r>
+            <a:r>
+              <a:rPr lang="en-US" baseline="0" dirty="0" err="1" smtClean="0"/>
+              <a:t>ad_spot</a:t>
+            </a:r>
             <a:endParaRPr lang="en-US" baseline="0" dirty="0" smtClean="0"/>
           </a:p>
           <a:p>
             <a:r>
               <a:rPr lang="en-US" baseline="0" dirty="0" smtClean="0"/>
-              <a:t>aside</a:t>
-            </a:r>
+              <a:t>	.aside</a:t>
+            </a:r>
+            <a:endParaRPr lang="en-US" baseline="0" dirty="0" smtClean="0"/>
           </a:p>
           <a:p>
             <a:r>
@@ -652,12 +687,20 @@
               <a:t>  </a:t>
             </a:r>
             <a:r>
+              <a:rPr lang="en-US" baseline="0" dirty="0" smtClean="0"/>
+              <a:t>  		</a:t>
+            </a:r>
+            <a:r>
               <a:rPr lang="en-US" baseline="0" dirty="0" err="1" smtClean="0"/>
               <a:t>recent_terms</a:t>
             </a:r>
             <a:r>
               <a:rPr lang="en-US" baseline="0" dirty="0" smtClean="0"/>
-              <a:t>, advertisement, </a:t>
+              <a:t>, </a:t>
+            </a:r>
+            <a:r>
+              <a:rPr lang="en-US" baseline="0" smtClean="0"/>
+              <a:t>ad_aside, </a:t>
             </a:r>
             <a:r>
               <a:rPr lang="en-US" baseline="0" dirty="0" err="1" smtClean="0"/>
@@ -4249,7 +4292,7 @@
           <a:p>
             <a:fld id="{A0092779-0FA5-4774-8259-C4C96C049AC6}" type="datetimeFigureOut">
               <a:rPr lang="en-US" smtClean="0"/>
-              <a:t>8/6/15 Thu</a:t>
+              <a:t>8/9/15 Sun</a:t>
             </a:fld>
             <a:endParaRPr lang="en-US"/>
           </a:p>
@@ -4419,7 +4462,7 @@
           <a:p>
             <a:fld id="{A0092779-0FA5-4774-8259-C4C96C049AC6}" type="datetimeFigureOut">
               <a:rPr lang="en-US" smtClean="0"/>
-              <a:t>8/6/15 Thu</a:t>
+              <a:t>8/9/15 Sun</a:t>
             </a:fld>
             <a:endParaRPr lang="en-US"/>
           </a:p>
@@ -4599,7 +4642,7 @@
           <a:p>
             <a:fld id="{A0092779-0FA5-4774-8259-C4C96C049AC6}" type="datetimeFigureOut">
               <a:rPr lang="en-US" smtClean="0"/>
-              <a:t>8/6/15 Thu</a:t>
+              <a:t>8/9/15 Sun</a:t>
             </a:fld>
             <a:endParaRPr lang="en-US"/>
           </a:p>
@@ -4769,7 +4812,7 @@
           <a:p>
             <a:fld id="{A0092779-0FA5-4774-8259-C4C96C049AC6}" type="datetimeFigureOut">
               <a:rPr lang="en-US" smtClean="0"/>
-              <a:t>8/6/15 Thu</a:t>
+              <a:t>8/9/15 Sun</a:t>
             </a:fld>
             <a:endParaRPr lang="en-US"/>
           </a:p>
@@ -5015,7 +5058,7 @@
           <a:p>
             <a:fld id="{A0092779-0FA5-4774-8259-C4C96C049AC6}" type="datetimeFigureOut">
               <a:rPr lang="en-US" smtClean="0"/>
-              <a:t>8/6/15 Thu</a:t>
+              <a:t>8/9/15 Sun</a:t>
             </a:fld>
             <a:endParaRPr lang="en-US"/>
           </a:p>
@@ -5247,7 +5290,7 @@
           <a:p>
             <a:fld id="{A0092779-0FA5-4774-8259-C4C96C049AC6}" type="datetimeFigureOut">
               <a:rPr lang="en-US" smtClean="0"/>
-              <a:t>8/6/15 Thu</a:t>
+              <a:t>8/9/15 Sun</a:t>
             </a:fld>
             <a:endParaRPr lang="en-US"/>
           </a:p>
@@ -5614,7 +5657,7 @@
           <a:p>
             <a:fld id="{A0092779-0FA5-4774-8259-C4C96C049AC6}" type="datetimeFigureOut">
               <a:rPr lang="en-US" smtClean="0"/>
-              <a:t>8/6/15 Thu</a:t>
+              <a:t>8/9/15 Sun</a:t>
             </a:fld>
             <a:endParaRPr lang="en-US"/>
           </a:p>
@@ -5732,7 +5775,7 @@
           <a:p>
             <a:fld id="{A0092779-0FA5-4774-8259-C4C96C049AC6}" type="datetimeFigureOut">
               <a:rPr lang="en-US" smtClean="0"/>
-              <a:t>8/6/15 Thu</a:t>
+              <a:t>8/9/15 Sun</a:t>
             </a:fld>
             <a:endParaRPr lang="en-US"/>
           </a:p>
@@ -5827,7 +5870,7 @@
           <a:p>
             <a:fld id="{A0092779-0FA5-4774-8259-C4C96C049AC6}" type="datetimeFigureOut">
               <a:rPr lang="en-US" smtClean="0"/>
-              <a:t>8/6/15 Thu</a:t>
+              <a:t>8/9/15 Sun</a:t>
             </a:fld>
             <a:endParaRPr lang="en-US"/>
           </a:p>
@@ -6104,7 +6147,7 @@
           <a:p>
             <a:fld id="{A0092779-0FA5-4774-8259-C4C96C049AC6}" type="datetimeFigureOut">
               <a:rPr lang="en-US" smtClean="0"/>
-              <a:t>8/6/15 Thu</a:t>
+              <a:t>8/9/15 Sun</a:t>
             </a:fld>
             <a:endParaRPr lang="en-US"/>
           </a:p>
@@ -6357,7 +6400,7 @@
           <a:p>
             <a:fld id="{A0092779-0FA5-4774-8259-C4C96C049AC6}" type="datetimeFigureOut">
               <a:rPr lang="en-US" smtClean="0"/>
-              <a:t>8/6/15 Thu</a:t>
+              <a:t>8/9/15 Sun</a:t>
             </a:fld>
             <a:endParaRPr lang="en-US"/>
           </a:p>
@@ -6570,7 +6613,7 @@
           <a:p>
             <a:fld id="{A0092779-0FA5-4774-8259-C4C96C049AC6}" type="datetimeFigureOut">
               <a:rPr lang="en-US" smtClean="0"/>
-              <a:t>8/6/15 Thu</a:t>
+              <a:t>8/9/15 Sun</a:t>
             </a:fld>
             <a:endParaRPr lang="en-US"/>
           </a:p>
@@ -6983,8 +7026,8 @@
         </p:nvSpPr>
         <p:spPr>
           <a:xfrm>
-            <a:off x="1862254" y="342132"/>
-            <a:ext cx="7584296" cy="6133514"/>
+            <a:off x="1862254" y="1105137"/>
+            <a:ext cx="7584296" cy="5370508"/>
           </a:xfrm>
           <a:prstGeom prst="rect">
             <a:avLst/>
@@ -7011,10 +7054,18 @@
           </a:fontRef>
         </p:style>
         <p:txBody>
-          <a:bodyPr rtlCol="0" anchor="t"/>
-          <a:lstStyle/>
-          <a:p>
-            <a:pPr algn="ctr"/>
+          <a:bodyPr rtlCol="0" anchor="ctr"/>
+          <a:lstStyle/>
+          <a:p>
+            <a:pPr algn="ctr"/>
+            <a:r>
+              <a:rPr lang="en-US" sz="1100" dirty="0" smtClean="0">
+                <a:solidFill>
+                  <a:schemeClr val="tx1"/>
+                </a:solidFill>
+              </a:rPr>
+              <a:t>#container</a:t>
+            </a:r>
             <a:endParaRPr lang="en-US" sz="1100" dirty="0">
               <a:solidFill>
                 <a:schemeClr val="tx1"/>
@@ -7061,10 +7112,18 @@
           </a:fontRef>
         </p:style>
         <p:txBody>
-          <a:bodyPr rtlCol="0" anchor="t"/>
-          <a:lstStyle/>
-          <a:p>
-            <a:pPr algn="ctr"/>
+          <a:bodyPr rtlCol="0" anchor="ctr"/>
+          <a:lstStyle/>
+          <a:p>
+            <a:pPr algn="ctr"/>
+            <a:r>
+              <a:rPr lang="en-US" sz="1100" dirty="0" smtClean="0">
+                <a:solidFill>
+                  <a:schemeClr val="tx1"/>
+                </a:solidFill>
+              </a:rPr>
+              <a:t>#header</a:t>
+            </a:r>
             <a:endParaRPr lang="en-US" sz="1100" dirty="0">
               <a:solidFill>
                 <a:schemeClr val="tx1"/>
@@ -7088,10 +7147,9 @@
             <a:avLst/>
           </a:prstGeom>
           <a:solidFill>
-            <a:schemeClr val="accent1">
-              <a:lumMod val="20000"/>
-              <a:lumOff val="80000"/>
-            </a:schemeClr>
+            <a:srgbClr val="DEEBF7">
+              <a:alpha val="50196"/>
+            </a:srgbClr>
           </a:solidFill>
           <a:ln w="19050"/>
         </p:spPr>
@@ -7147,10 +7205,9 @@
             <a:avLst/>
           </a:prstGeom>
           <a:solidFill>
-            <a:schemeClr val="accent1">
-              <a:lumMod val="20000"/>
-              <a:lumOff val="80000"/>
-            </a:schemeClr>
+            <a:srgbClr val="DEEBF7">
+              <a:alpha val="50196"/>
+            </a:srgbClr>
           </a:solidFill>
           <a:ln w="19050"/>
         </p:spPr>
@@ -7206,10 +7263,9 @@
             <a:avLst/>
           </a:prstGeom>
           <a:solidFill>
-            <a:schemeClr val="accent1">
-              <a:lumMod val="20000"/>
-              <a:lumOff val="80000"/>
-            </a:schemeClr>
+            <a:srgbClr val="DEEBF7">
+              <a:alpha val="50196"/>
+            </a:srgbClr>
           </a:solidFill>
           <a:ln w="19050"/>
         </p:spPr>
@@ -7265,10 +7321,9 @@
             <a:avLst/>
           </a:prstGeom>
           <a:solidFill>
-            <a:schemeClr val="accent1">
-              <a:lumMod val="20000"/>
-              <a:lumOff val="80000"/>
-            </a:schemeClr>
+            <a:srgbClr val="DEEBF7">
+              <a:alpha val="50196"/>
+            </a:srgbClr>
           </a:solidFill>
           <a:ln w="19050"/>
         </p:spPr>
@@ -7324,10 +7379,9 @@
             <a:avLst/>
           </a:prstGeom>
           <a:solidFill>
-            <a:schemeClr val="accent1">
-              <a:lumMod val="20000"/>
-              <a:lumOff val="80000"/>
-            </a:schemeClr>
+            <a:srgbClr val="DEEBF7">
+              <a:alpha val="50196"/>
+            </a:srgbClr>
           </a:solidFill>
           <a:ln w="19050"/>
         </p:spPr>
@@ -7379,40 +7433,48 @@
         </p:nvSpPr>
         <p:spPr>
           <a:xfrm>
-            <a:off x="2241395" y="1151581"/>
-            <a:ext cx="6856423" cy="1730592"/>
-          </a:xfrm>
-          <a:prstGeom prst="rect">
-            <a:avLst/>
-          </a:prstGeom>
-          <a:solidFill>
-            <a:schemeClr val="bg1">
-              <a:lumMod val="95000"/>
-            </a:schemeClr>
-          </a:solidFill>
-          <a:ln w="19050"/>
-        </p:spPr>
-        <p:style>
-          <a:lnRef idx="2">
-            <a:schemeClr val="accent1">
-              <a:shade val="50000"/>
-            </a:schemeClr>
-          </a:lnRef>
-          <a:fillRef idx="1">
-            <a:schemeClr val="accent1"/>
-          </a:fillRef>
-          <a:effectRef idx="0">
-            <a:schemeClr val="accent1"/>
-          </a:effectRef>
-          <a:fontRef idx="minor">
-            <a:schemeClr val="lt1"/>
-          </a:fontRef>
-        </p:style>
-        <p:txBody>
-          <a:bodyPr rtlCol="0" anchor="t"/>
-          <a:lstStyle/>
-          <a:p>
-            <a:pPr algn="ctr"/>
+            <a:off x="2241395" y="1222917"/>
+            <a:ext cx="6856423" cy="895077"/>
+          </a:xfrm>
+          <a:prstGeom prst="rect">
+            <a:avLst/>
+          </a:prstGeom>
+          <a:solidFill>
+            <a:srgbClr val="F2F2F2">
+              <a:alpha val="50196"/>
+            </a:srgbClr>
+          </a:solidFill>
+          <a:ln w="19050"/>
+        </p:spPr>
+        <p:style>
+          <a:lnRef idx="2">
+            <a:schemeClr val="accent1">
+              <a:shade val="50000"/>
+            </a:schemeClr>
+          </a:lnRef>
+          <a:fillRef idx="1">
+            <a:schemeClr val="accent1"/>
+          </a:fillRef>
+          <a:effectRef idx="0">
+            <a:schemeClr val="accent1"/>
+          </a:effectRef>
+          <a:fontRef idx="minor">
+            <a:schemeClr val="lt1"/>
+          </a:fontRef>
+        </p:style>
+        <p:txBody>
+          <a:bodyPr rtlCol="0" anchor="ctr"/>
+          <a:lstStyle/>
+          <a:p>
+            <a:pPr algn="ctr"/>
+            <a:r>
+              <a:rPr lang="en-US" sz="1100" dirty="0" smtClean="0">
+                <a:solidFill>
+                  <a:schemeClr val="tx1"/>
+                </a:solidFill>
+              </a:rPr>
+              <a:t>.spot</a:t>
+            </a:r>
             <a:endParaRPr lang="en-US" sz="1100" dirty="0">
               <a:solidFill>
                 <a:schemeClr val="tx1"/>
@@ -7429,16 +7491,16 @@
         </p:nvSpPr>
         <p:spPr>
           <a:xfrm>
-            <a:off x="2241394" y="3130594"/>
-            <a:ext cx="5018049" cy="3030426"/>
-          </a:xfrm>
-          <a:prstGeom prst="rect">
-            <a:avLst/>
-          </a:prstGeom>
-          <a:solidFill>
-            <a:schemeClr val="bg1">
-              <a:lumMod val="95000"/>
-            </a:schemeClr>
+            <a:off x="2241395" y="2304470"/>
+            <a:ext cx="5018049" cy="3847512"/>
+          </a:xfrm>
+          <a:prstGeom prst="rect">
+            <a:avLst/>
+          </a:prstGeom>
+          <a:solidFill>
+            <a:srgbClr val="F2F2F2">
+              <a:alpha val="50196"/>
+            </a:srgbClr>
           </a:solidFill>
           <a:ln w="19050"/>
         </p:spPr>
@@ -7469,7 +7531,7 @@
                   <a:schemeClr val="tx1"/>
                 </a:solidFill>
               </a:rPr>
-              <a:t>EN_PANE</a:t>
+              <a:t>#content</a:t>
             </a:r>
             <a:endParaRPr lang="en-US" sz="1100" dirty="0">
               <a:solidFill>
@@ -7481,44 +7543,54 @@
       </p:sp>
       <p:sp>
         <p:nvSpPr>
-          <p:cNvPr id="41" name="searchBar"/>
-          <p:cNvSpPr/>
-          <p:nvPr/>
-        </p:nvSpPr>
-        <p:spPr>
-          <a:xfrm>
-            <a:off x="2442116" y="1987334"/>
-            <a:ext cx="6445405" cy="752628"/>
-          </a:xfrm>
-          <a:prstGeom prst="rect">
-            <a:avLst/>
-          </a:prstGeom>
-          <a:solidFill>
-            <a:schemeClr val="bg1"/>
-          </a:solidFill>
-          <a:ln w="19050"/>
-        </p:spPr>
-        <p:style>
-          <a:lnRef idx="2">
-            <a:schemeClr val="accent1">
-              <a:shade val="50000"/>
-            </a:schemeClr>
-          </a:lnRef>
-          <a:fillRef idx="1">
-            <a:schemeClr val="accent1"/>
-          </a:fillRef>
-          <a:effectRef idx="0">
-            <a:schemeClr val="accent1"/>
-          </a:effectRef>
-          <a:fontRef idx="minor">
-            <a:schemeClr val="lt1"/>
-          </a:fontRef>
-        </p:style>
-        <p:txBody>
-          <a:bodyPr rtlCol="0" anchor="t"/>
-          <a:lstStyle/>
-          <a:p>
-            <a:pPr algn="ctr"/>
+          <p:cNvPr id="43" name="searchBar"/>
+          <p:cNvSpPr/>
+          <p:nvPr/>
+        </p:nvSpPr>
+        <p:spPr>
+          <a:xfrm>
+            <a:off x="2900598" y="1347094"/>
+            <a:ext cx="5390693" cy="546721"/>
+          </a:xfrm>
+          <a:prstGeom prst="rect">
+            <a:avLst/>
+          </a:prstGeom>
+          <a:solidFill>
+            <a:srgbClr val="DEEBF7">
+              <a:alpha val="50196"/>
+            </a:srgbClr>
+          </a:solidFill>
+          <a:ln w="19050"/>
+        </p:spPr>
+        <p:style>
+          <a:lnRef idx="2">
+            <a:schemeClr val="accent1">
+              <a:shade val="50000"/>
+            </a:schemeClr>
+          </a:lnRef>
+          <a:fillRef idx="1">
+            <a:schemeClr val="accent1"/>
+          </a:fillRef>
+          <a:effectRef idx="0">
+            <a:schemeClr val="accent1"/>
+          </a:effectRef>
+          <a:fontRef idx="minor">
+            <a:schemeClr val="lt1"/>
+          </a:fontRef>
+        </p:style>
+        <p:txBody>
+          <a:bodyPr rtlCol="0" anchor="ctr"/>
+          <a:lstStyle/>
+          <a:p>
+            <a:pPr algn="ctr"/>
+            <a:r>
+              <a:rPr lang="en-US" sz="1100" dirty="0" smtClean="0">
+                <a:solidFill>
+                  <a:schemeClr val="tx1"/>
+                </a:solidFill>
+              </a:rPr>
+              <a:t>.ad_1</a:t>
+            </a:r>
             <a:endParaRPr lang="en-US" sz="1100" dirty="0">
               <a:solidFill>
                 <a:schemeClr val="tx1"/>
@@ -7529,23 +7601,204 @@
       </p:sp>
       <p:sp>
         <p:nvSpPr>
-          <p:cNvPr id="43" name="searchBar"/>
-          <p:cNvSpPr/>
-          <p:nvPr/>
-        </p:nvSpPr>
-        <p:spPr>
-          <a:xfrm>
-            <a:off x="2900597" y="2078999"/>
-            <a:ext cx="5390693" cy="546721"/>
-          </a:xfrm>
-          <a:prstGeom prst="rect">
-            <a:avLst/>
-          </a:prstGeom>
-          <a:solidFill>
-            <a:schemeClr val="accent1">
-              <a:lumMod val="20000"/>
-              <a:lumOff val="80000"/>
-            </a:schemeClr>
+          <p:cNvPr id="44" name="직사각형 43"/>
+          <p:cNvSpPr/>
+          <p:nvPr/>
+        </p:nvSpPr>
+        <p:spPr>
+          <a:xfrm>
+            <a:off x="2424713" y="2547048"/>
+            <a:ext cx="4651410" cy="3294194"/>
+          </a:xfrm>
+          <a:prstGeom prst="rect">
+            <a:avLst/>
+          </a:prstGeom>
+          <a:solidFill>
+            <a:srgbClr val="FFFFFF">
+              <a:alpha val="50196"/>
+            </a:srgbClr>
+          </a:solidFill>
+          <a:ln w="19050"/>
+        </p:spPr>
+        <p:style>
+          <a:lnRef idx="2">
+            <a:schemeClr val="accent1">
+              <a:shade val="50000"/>
+            </a:schemeClr>
+          </a:lnRef>
+          <a:fillRef idx="1">
+            <a:schemeClr val="accent1"/>
+          </a:fillRef>
+          <a:effectRef idx="0">
+            <a:schemeClr val="accent1"/>
+          </a:effectRef>
+          <a:fontRef idx="minor">
+            <a:schemeClr val="lt1"/>
+          </a:fontRef>
+        </p:style>
+        <p:txBody>
+          <a:bodyPr rtlCol="0" anchor="ctr"/>
+          <a:lstStyle/>
+          <a:p>
+            <a:pPr algn="ctr"/>
+            <a:r>
+              <a:rPr lang="en-US" sz="1100" dirty="0" smtClean="0">
+                <a:solidFill>
+                  <a:schemeClr val="tx1"/>
+                </a:solidFill>
+              </a:rPr>
+              <a:t>.</a:t>
+            </a:r>
+            <a:r>
+              <a:rPr lang="en-US" sz="1100" dirty="0" err="1" smtClean="0">
+                <a:solidFill>
+                  <a:schemeClr val="tx1"/>
+                </a:solidFill>
+              </a:rPr>
+              <a:t>entry_pane</a:t>
+            </a:r>
+            <a:endParaRPr lang="en-US" sz="1100" dirty="0">
+              <a:solidFill>
+                <a:schemeClr val="tx1"/>
+              </a:solidFill>
+            </a:endParaRPr>
+          </a:p>
+        </p:txBody>
+      </p:sp>
+      <p:sp>
+        <p:nvSpPr>
+          <p:cNvPr id="54" name="searchBar"/>
+          <p:cNvSpPr/>
+          <p:nvPr/>
+        </p:nvSpPr>
+        <p:spPr>
+          <a:xfrm>
+            <a:off x="7479722" y="2304471"/>
+            <a:ext cx="1618096" cy="3857838"/>
+          </a:xfrm>
+          <a:prstGeom prst="rect">
+            <a:avLst/>
+          </a:prstGeom>
+          <a:solidFill>
+            <a:srgbClr val="F2F2F2">
+              <a:alpha val="50196"/>
+            </a:srgbClr>
+          </a:solidFill>
+          <a:ln w="19050"/>
+        </p:spPr>
+        <p:style>
+          <a:lnRef idx="2">
+            <a:schemeClr val="accent1">
+              <a:shade val="50000"/>
+            </a:schemeClr>
+          </a:lnRef>
+          <a:fillRef idx="1">
+            <a:schemeClr val="accent1"/>
+          </a:fillRef>
+          <a:effectRef idx="0">
+            <a:schemeClr val="accent1"/>
+          </a:effectRef>
+          <a:fontRef idx="minor">
+            <a:schemeClr val="lt1"/>
+          </a:fontRef>
+        </p:style>
+        <p:txBody>
+          <a:bodyPr rtlCol="0" anchor="ctr"/>
+          <a:lstStyle/>
+          <a:p>
+            <a:pPr algn="ctr"/>
+            <a:r>
+              <a:rPr lang="en-US" sz="1100" dirty="0" smtClean="0">
+                <a:solidFill>
+                  <a:schemeClr val="tx1"/>
+                </a:solidFill>
+              </a:rPr>
+              <a:t>.aside</a:t>
+            </a:r>
+            <a:endParaRPr lang="en-US" sz="1100" dirty="0">
+              <a:solidFill>
+                <a:schemeClr val="tx1"/>
+              </a:solidFill>
+            </a:endParaRPr>
+          </a:p>
+        </p:txBody>
+      </p:sp>
+      <p:sp>
+        <p:nvSpPr>
+          <p:cNvPr id="56" name="searchBar"/>
+          <p:cNvSpPr/>
+          <p:nvPr/>
+        </p:nvSpPr>
+        <p:spPr>
+          <a:xfrm>
+            <a:off x="7632862" y="2547048"/>
+            <a:ext cx="1338872" cy="835654"/>
+          </a:xfrm>
+          <a:prstGeom prst="rect">
+            <a:avLst/>
+          </a:prstGeom>
+          <a:solidFill>
+            <a:srgbClr val="FFFFFF">
+              <a:alpha val="50196"/>
+            </a:srgbClr>
+          </a:solidFill>
+          <a:ln w="19050"/>
+        </p:spPr>
+        <p:style>
+          <a:lnRef idx="2">
+            <a:schemeClr val="accent1">
+              <a:shade val="50000"/>
+            </a:schemeClr>
+          </a:lnRef>
+          <a:fillRef idx="1">
+            <a:schemeClr val="accent1"/>
+          </a:fillRef>
+          <a:effectRef idx="0">
+            <a:schemeClr val="accent1"/>
+          </a:effectRef>
+          <a:fontRef idx="minor">
+            <a:schemeClr val="lt1"/>
+          </a:fontRef>
+        </p:style>
+        <p:txBody>
+          <a:bodyPr rtlCol="0" anchor="ctr"/>
+          <a:lstStyle/>
+          <a:p>
+            <a:pPr algn="ctr"/>
+            <a:r>
+              <a:rPr lang="en-US" sz="1100" dirty="0" smtClean="0">
+                <a:solidFill>
+                  <a:schemeClr val="tx1"/>
+                </a:solidFill>
+              </a:rPr>
+              <a:t>RT</a:t>
+            </a:r>
+            <a:endParaRPr lang="en-US" sz="1100" dirty="0">
+              <a:solidFill>
+                <a:schemeClr val="tx1"/>
+              </a:solidFill>
+            </a:endParaRPr>
+          </a:p>
+        </p:txBody>
+      </p:sp>
+      <p:sp>
+        <p:nvSpPr>
+          <p:cNvPr id="27" name="searchBar"/>
+          <p:cNvSpPr/>
+          <p:nvPr/>
+        </p:nvSpPr>
+        <p:spPr>
+          <a:xfrm>
+            <a:off x="7632862" y="3492381"/>
+            <a:ext cx="1338872" cy="837211"/>
+          </a:xfrm>
+          <a:prstGeom prst="rect">
+            <a:avLst/>
+          </a:prstGeom>
+          <a:solidFill>
+            <a:srgbClr val="DEEBF7">
+              <a:alpha val="50196"/>
+            </a:srgbClr>
           </a:solidFill>
           <a:ln w="19050"/>
         </p:spPr>
@@ -7588,241 +7841,22 @@
       </p:sp>
       <p:sp>
         <p:nvSpPr>
-          <p:cNvPr id="44" name="직사각형 43"/>
-          <p:cNvSpPr/>
-          <p:nvPr/>
-        </p:nvSpPr>
-        <p:spPr>
-          <a:xfrm>
-            <a:off x="2442117" y="3284263"/>
-            <a:ext cx="4651410" cy="1224237"/>
-          </a:xfrm>
-          <a:prstGeom prst="rect">
-            <a:avLst/>
-          </a:prstGeom>
-          <a:solidFill>
-            <a:schemeClr val="bg1"/>
-          </a:solidFill>
-          <a:ln w="19050"/>
-        </p:spPr>
-        <p:style>
-          <a:lnRef idx="2">
-            <a:schemeClr val="accent1">
-              <a:shade val="50000"/>
-            </a:schemeClr>
-          </a:lnRef>
-          <a:fillRef idx="1">
-            <a:schemeClr val="accent1"/>
-          </a:fillRef>
-          <a:effectRef idx="0">
-            <a:schemeClr val="accent1"/>
-          </a:effectRef>
-          <a:fontRef idx="minor">
-            <a:schemeClr val="lt1"/>
-          </a:fontRef>
-        </p:style>
-        <p:txBody>
-          <a:bodyPr rtlCol="0" anchor="ctr"/>
-          <a:lstStyle/>
-          <a:p>
-            <a:pPr algn="ctr"/>
-            <a:r>
-              <a:rPr lang="en-US" sz="1100" dirty="0" smtClean="0">
-                <a:solidFill>
-                  <a:schemeClr val="tx1"/>
-                </a:solidFill>
-              </a:rPr>
-              <a:t>EN</a:t>
-            </a:r>
-            <a:endParaRPr lang="en-US" sz="1100" dirty="0">
-              <a:solidFill>
-                <a:schemeClr val="tx1"/>
-              </a:solidFill>
-            </a:endParaRPr>
-          </a:p>
-        </p:txBody>
-      </p:sp>
-      <p:sp>
-        <p:nvSpPr>
-          <p:cNvPr id="54" name="searchBar"/>
-          <p:cNvSpPr/>
-          <p:nvPr/>
-        </p:nvSpPr>
-        <p:spPr>
-          <a:xfrm>
-            <a:off x="7479722" y="3123047"/>
-            <a:ext cx="1618096" cy="3039261"/>
-          </a:xfrm>
-          <a:prstGeom prst="rect">
-            <a:avLst/>
-          </a:prstGeom>
-          <a:solidFill>
-            <a:schemeClr val="bg1">
-              <a:lumMod val="95000"/>
-            </a:schemeClr>
-          </a:solidFill>
-          <a:ln w="19050"/>
-        </p:spPr>
-        <p:style>
-          <a:lnRef idx="2">
-            <a:schemeClr val="accent1">
-              <a:shade val="50000"/>
-            </a:schemeClr>
-          </a:lnRef>
-          <a:fillRef idx="1">
-            <a:schemeClr val="accent1"/>
-          </a:fillRef>
-          <a:effectRef idx="0">
-            <a:schemeClr val="accent1"/>
-          </a:effectRef>
-          <a:fontRef idx="minor">
-            <a:schemeClr val="lt1"/>
-          </a:fontRef>
-        </p:style>
-        <p:txBody>
-          <a:bodyPr rtlCol="0" anchor="t"/>
-          <a:lstStyle/>
-          <a:p>
-            <a:pPr algn="ctr"/>
-            <a:endParaRPr lang="en-US" sz="1100" dirty="0">
-              <a:solidFill>
-                <a:schemeClr val="tx1"/>
-              </a:solidFill>
-            </a:endParaRPr>
-          </a:p>
-        </p:txBody>
-      </p:sp>
-      <p:sp>
-        <p:nvSpPr>
-          <p:cNvPr id="56" name="searchBar"/>
-          <p:cNvSpPr/>
-          <p:nvPr/>
-        </p:nvSpPr>
-        <p:spPr>
-          <a:xfrm>
-            <a:off x="7632862" y="3265292"/>
-            <a:ext cx="1338872" cy="835654"/>
-          </a:xfrm>
-          <a:prstGeom prst="rect">
-            <a:avLst/>
-          </a:prstGeom>
-          <a:solidFill>
-            <a:schemeClr val="bg1"/>
-          </a:solidFill>
-          <a:ln w="19050"/>
-        </p:spPr>
-        <p:style>
-          <a:lnRef idx="2">
-            <a:schemeClr val="accent1">
-              <a:shade val="50000"/>
-            </a:schemeClr>
-          </a:lnRef>
-          <a:fillRef idx="1">
-            <a:schemeClr val="accent1"/>
-          </a:fillRef>
-          <a:effectRef idx="0">
-            <a:schemeClr val="accent1"/>
-          </a:effectRef>
-          <a:fontRef idx="minor">
-            <a:schemeClr val="lt1"/>
-          </a:fontRef>
-        </p:style>
-        <p:txBody>
-          <a:bodyPr rtlCol="0" anchor="ctr"/>
-          <a:lstStyle/>
-          <a:p>
-            <a:pPr algn="ctr"/>
-            <a:r>
-              <a:rPr lang="en-US" sz="1100" dirty="0" smtClean="0">
-                <a:solidFill>
-                  <a:schemeClr val="tx1"/>
-                </a:solidFill>
-              </a:rPr>
-              <a:t>RT</a:t>
-            </a:r>
-            <a:endParaRPr lang="en-US" sz="1100" dirty="0">
-              <a:solidFill>
-                <a:schemeClr val="tx1"/>
-              </a:solidFill>
-            </a:endParaRPr>
-          </a:p>
-        </p:txBody>
-      </p:sp>
-      <p:sp>
-        <p:nvSpPr>
-          <p:cNvPr id="27" name="searchBar"/>
-          <p:cNvSpPr/>
-          <p:nvPr/>
-        </p:nvSpPr>
-        <p:spPr>
-          <a:xfrm>
-            <a:off x="7632862" y="4230718"/>
-            <a:ext cx="1338872" cy="837211"/>
-          </a:xfrm>
-          <a:prstGeom prst="rect">
-            <a:avLst/>
-          </a:prstGeom>
-          <a:solidFill>
-            <a:schemeClr val="accent1">
-              <a:lumMod val="20000"/>
-              <a:lumOff val="80000"/>
-            </a:schemeClr>
-          </a:solidFill>
-          <a:ln w="19050"/>
-        </p:spPr>
-        <p:style>
-          <a:lnRef idx="2">
-            <a:schemeClr val="accent1">
-              <a:shade val="50000"/>
-            </a:schemeClr>
-          </a:lnRef>
-          <a:fillRef idx="1">
-            <a:schemeClr val="accent1"/>
-          </a:fillRef>
-          <a:effectRef idx="0">
-            <a:schemeClr val="accent1"/>
-          </a:effectRef>
-          <a:fontRef idx="minor">
-            <a:schemeClr val="lt1"/>
-          </a:fontRef>
-        </p:style>
-        <p:txBody>
-          <a:bodyPr rtlCol="0" anchor="ctr"/>
-          <a:lstStyle/>
-          <a:p>
-            <a:pPr algn="ctr"/>
-            <a:r>
-              <a:rPr lang="en-US" sz="1100" dirty="0" smtClean="0">
-                <a:solidFill>
-                  <a:schemeClr val="tx1"/>
-                </a:solidFill>
-              </a:rPr>
-              <a:t>AD</a:t>
-            </a:r>
-            <a:endParaRPr lang="en-US" sz="1100" dirty="0">
-              <a:solidFill>
-                <a:schemeClr val="tx1"/>
-              </a:solidFill>
-            </a:endParaRPr>
-          </a:p>
-        </p:txBody>
-      </p:sp>
-      <p:sp>
-        <p:nvSpPr>
           <p:cNvPr id="42" name="searchBar"/>
           <p:cNvSpPr/>
           <p:nvPr/>
         </p:nvSpPr>
         <p:spPr>
           <a:xfrm>
-            <a:off x="7632861" y="5207513"/>
+            <a:off x="7632861" y="4469176"/>
             <a:ext cx="1352557" cy="835654"/>
           </a:xfrm>
           <a:prstGeom prst="rect">
             <a:avLst/>
           </a:prstGeom>
           <a:solidFill>
-            <a:schemeClr val="bg1"/>
+            <a:srgbClr val="FFFFFF">
+              <a:alpha val="50196"/>
+            </a:srgbClr>
           </a:solidFill>
           <a:ln w="19050"/>
         </p:spPr>
@@ -7854,62 +7888,6 @@
                 </a:solidFill>
               </a:rPr>
               <a:t>SN</a:t>
-            </a:r>
-            <a:endParaRPr lang="en-US" sz="1100" dirty="0">
-              <a:solidFill>
-                <a:schemeClr val="tx1"/>
-              </a:solidFill>
-            </a:endParaRPr>
-          </a:p>
-        </p:txBody>
-      </p:sp>
-      <p:sp>
-        <p:nvSpPr>
-          <p:cNvPr id="64" name="직사각형 63"/>
-          <p:cNvSpPr/>
-          <p:nvPr/>
-        </p:nvSpPr>
-        <p:spPr>
-          <a:xfrm>
-            <a:off x="2442117" y="1243879"/>
-            <a:ext cx="6445404" cy="624313"/>
-          </a:xfrm>
-          <a:prstGeom prst="rect">
-            <a:avLst/>
-          </a:prstGeom>
-          <a:solidFill>
-            <a:schemeClr val="bg1"/>
-          </a:solidFill>
-          <a:ln w="19050"/>
-        </p:spPr>
-        <p:style>
-          <a:lnRef idx="2">
-            <a:schemeClr val="accent1">
-              <a:shade val="50000"/>
-            </a:schemeClr>
-          </a:lnRef>
-          <a:fillRef idx="1">
-            <a:schemeClr val="accent1"/>
-          </a:fillRef>
-          <a:effectRef idx="0">
-            <a:schemeClr val="accent1"/>
-          </a:effectRef>
-          <a:fontRef idx="minor">
-            <a:schemeClr val="lt1"/>
-          </a:fontRef>
-        </p:style>
-        <p:txBody>
-          <a:bodyPr rtlCol="0" anchor="ctr"/>
-          <a:lstStyle/>
-          <a:p>
-            <a:pPr algn="ctr"/>
-            <a:r>
-              <a:rPr lang="en-US" sz="1100" dirty="0" smtClean="0">
-                <a:solidFill>
-                  <a:schemeClr val="tx1"/>
-                </a:solidFill>
-              </a:rPr>
-              <a:t>BOARD</a:t>
             </a:r>
             <a:endParaRPr lang="en-US" sz="1100" dirty="0">
               <a:solidFill>

</xml_diff>